<commit_message>
Final Touches to Project Report
Finished Final touches to the report before submission
</commit_message>
<xml_diff>
--- a/PhamilyFotos/Project Research/PhamilyFotosPresentation.pptx
+++ b/PhamilyFotos/Project Research/PhamilyFotosPresentation.pptx
@@ -290,7 +290,7 @@
           <a:p>
             <a:fld id="{97BEF524-93A5-4F19-BB8C-8EFBD1957699}" type="datetimeFigureOut">
               <a:rPr lang="en-IE" smtClean="0"/>
-              <a:t>13/05/2014</a:t>
+              <a:t>28/05/2014</a:t>
             </a:fld>
             <a:endParaRPr lang="en-IE"/>
           </a:p>
@@ -460,7 +460,7 @@
           <a:p>
             <a:fld id="{97BEF524-93A5-4F19-BB8C-8EFBD1957699}" type="datetimeFigureOut">
               <a:rPr lang="en-IE" smtClean="0"/>
-              <a:t>13/05/2014</a:t>
+              <a:t>28/05/2014</a:t>
             </a:fld>
             <a:endParaRPr lang="en-IE"/>
           </a:p>
@@ -640,7 +640,7 @@
           <a:p>
             <a:fld id="{97BEF524-93A5-4F19-BB8C-8EFBD1957699}" type="datetimeFigureOut">
               <a:rPr lang="en-IE" smtClean="0"/>
-              <a:t>13/05/2014</a:t>
+              <a:t>28/05/2014</a:t>
             </a:fld>
             <a:endParaRPr lang="en-IE"/>
           </a:p>
@@ -810,7 +810,7 @@
           <a:p>
             <a:fld id="{97BEF524-93A5-4F19-BB8C-8EFBD1957699}" type="datetimeFigureOut">
               <a:rPr lang="en-IE" smtClean="0"/>
-              <a:t>13/05/2014</a:t>
+              <a:t>28/05/2014</a:t>
             </a:fld>
             <a:endParaRPr lang="en-IE"/>
           </a:p>
@@ -1056,7 +1056,7 @@
           <a:p>
             <a:fld id="{97BEF524-93A5-4F19-BB8C-8EFBD1957699}" type="datetimeFigureOut">
               <a:rPr lang="en-IE" smtClean="0"/>
-              <a:t>13/05/2014</a:t>
+              <a:t>28/05/2014</a:t>
             </a:fld>
             <a:endParaRPr lang="en-IE"/>
           </a:p>
@@ -1344,7 +1344,7 @@
           <a:p>
             <a:fld id="{97BEF524-93A5-4F19-BB8C-8EFBD1957699}" type="datetimeFigureOut">
               <a:rPr lang="en-IE" smtClean="0"/>
-              <a:t>13/05/2014</a:t>
+              <a:t>28/05/2014</a:t>
             </a:fld>
             <a:endParaRPr lang="en-IE"/>
           </a:p>
@@ -1766,7 +1766,7 @@
           <a:p>
             <a:fld id="{97BEF524-93A5-4F19-BB8C-8EFBD1957699}" type="datetimeFigureOut">
               <a:rPr lang="en-IE" smtClean="0"/>
-              <a:t>13/05/2014</a:t>
+              <a:t>28/05/2014</a:t>
             </a:fld>
             <a:endParaRPr lang="en-IE"/>
           </a:p>
@@ -1884,7 +1884,7 @@
           <a:p>
             <a:fld id="{97BEF524-93A5-4F19-BB8C-8EFBD1957699}" type="datetimeFigureOut">
               <a:rPr lang="en-IE" smtClean="0"/>
-              <a:t>13/05/2014</a:t>
+              <a:t>28/05/2014</a:t>
             </a:fld>
             <a:endParaRPr lang="en-IE"/>
           </a:p>
@@ -1979,7 +1979,7 @@
           <a:p>
             <a:fld id="{97BEF524-93A5-4F19-BB8C-8EFBD1957699}" type="datetimeFigureOut">
               <a:rPr lang="en-IE" smtClean="0"/>
-              <a:t>13/05/2014</a:t>
+              <a:t>28/05/2014</a:t>
             </a:fld>
             <a:endParaRPr lang="en-IE"/>
           </a:p>
@@ -2256,7 +2256,7 @@
           <a:p>
             <a:fld id="{97BEF524-93A5-4F19-BB8C-8EFBD1957699}" type="datetimeFigureOut">
               <a:rPr lang="en-IE" smtClean="0"/>
-              <a:t>13/05/2014</a:t>
+              <a:t>28/05/2014</a:t>
             </a:fld>
             <a:endParaRPr lang="en-IE"/>
           </a:p>
@@ -2509,7 +2509,7 @@
           <a:p>
             <a:fld id="{97BEF524-93A5-4F19-BB8C-8EFBD1957699}" type="datetimeFigureOut">
               <a:rPr lang="en-IE" smtClean="0"/>
-              <a:t>13/05/2014</a:t>
+              <a:t>28/05/2014</a:t>
             </a:fld>
             <a:endParaRPr lang="en-IE"/>
           </a:p>
@@ -2727,7 +2727,7 @@
           <a:p>
             <a:fld id="{97BEF524-93A5-4F19-BB8C-8EFBD1957699}" type="datetimeFigureOut">
               <a:rPr lang="en-IE" smtClean="0"/>
-              <a:t>13/05/2014</a:t>
+              <a:t>28/05/2014</a:t>
             </a:fld>
             <a:endParaRPr lang="en-IE"/>
           </a:p>
@@ -4024,7 +4024,7 @@
               <a:buChar char="•"/>
             </a:pPr>
             <a:r>
-              <a:rPr lang="en-IE" sz="2400" dirty="0" smtClean="0">
+              <a:rPr lang="en-IE" sz="2400" b="1" dirty="0" smtClean="0">
                 <a:latin typeface="Buxton Sketch" panose="03080500000500000004" pitchFamily="66" charset="0"/>
               </a:rPr>
               <a:t>People love to share their experiences online.</a:t>
@@ -4036,7 +4036,7 @@
               <a:buChar char="•"/>
             </a:pPr>
             <a:r>
-              <a:rPr lang="en-IE" sz="2400" dirty="0" smtClean="0">
+              <a:rPr lang="en-IE" sz="2400" b="1" dirty="0" smtClean="0">
                 <a:latin typeface="Buxton Sketch" panose="03080500000500000004" pitchFamily="66" charset="0"/>
               </a:rPr>
               <a:t>Images are easily (too easily) captured &amp; uploaded.</a:t>
@@ -4048,10 +4048,28 @@
               <a:buChar char="•"/>
             </a:pPr>
             <a:r>
-              <a:rPr lang="en-IE" sz="2400" dirty="0" smtClean="0">
+              <a:rPr lang="en-IE" sz="2400" b="1" dirty="0" smtClean="0">
                 <a:latin typeface="Buxton Sketch" panose="03080500000500000004" pitchFamily="66" charset="0"/>
               </a:rPr>
-              <a:t>Social Media sites exercise total control over content via their terms &amp; conditions.</a:t>
+              <a:t>(</a:t>
+            </a:r>
+            <a:r>
+              <a:rPr lang="en-IE" sz="2400" b="1" dirty="0" smtClean="0">
+                <a:latin typeface="Buxton Sketch" panose="03080500000500000004" pitchFamily="66" charset="0"/>
+              </a:rPr>
+              <a:t>Most) </a:t>
+            </a:r>
+            <a:r>
+              <a:rPr lang="en-IE" sz="2400" b="1" dirty="0" smtClean="0">
+                <a:latin typeface="Buxton Sketch" panose="03080500000500000004" pitchFamily="66" charset="0"/>
+              </a:rPr>
+              <a:t>Social </a:t>
+            </a:r>
+            <a:r>
+              <a:rPr lang="en-IE" sz="2400" b="1" dirty="0" smtClean="0">
+                <a:latin typeface="Buxton Sketch" panose="03080500000500000004" pitchFamily="66" charset="0"/>
+              </a:rPr>
+              <a:t>Media sites exercise total control over content via their terms &amp; conditions.</a:t>
             </a:r>
           </a:p>
           <a:p>
@@ -4060,7 +4078,7 @@
               <a:buChar char="•"/>
             </a:pPr>
             <a:r>
-              <a:rPr lang="en-IE" sz="2400" dirty="0" smtClean="0">
+              <a:rPr lang="en-IE" sz="2400" b="1" dirty="0" smtClean="0">
                 <a:latin typeface="Buxton Sketch" panose="03080500000500000004" pitchFamily="66" charset="0"/>
               </a:rPr>
               <a:t>People’s sense of control over their own privacy is being lost.</a:t>
@@ -4072,7 +4090,7 @@
               <a:buChar char="•"/>
             </a:pPr>
             <a:r>
-              <a:rPr lang="en-IE" sz="2400" dirty="0" smtClean="0">
+              <a:rPr lang="en-IE" sz="2400" b="1" dirty="0" smtClean="0">
                 <a:latin typeface="Buxton Sketch" panose="03080500000500000004" pitchFamily="66" charset="0"/>
               </a:rPr>
               <a:t>People have a desire limit who can see and use their images.</a:t>
@@ -4084,18 +4102,12 @@
               <a:buChar char="•"/>
             </a:pPr>
             <a:r>
-              <a:rPr lang="en-IE" sz="2400" dirty="0" smtClean="0">
+              <a:rPr lang="en-IE" sz="2400" b="1" dirty="0" smtClean="0">
                 <a:latin typeface="Buxton Sketch" panose="03080500000500000004" pitchFamily="66" charset="0"/>
               </a:rPr>
-              <a:t>Phamily Fotos plans to </a:t>
-            </a:r>
-            <a:r>
-              <a:rPr lang="en-IE" sz="2400" smtClean="0">
-                <a:latin typeface="Buxton Sketch" panose="03080500000500000004" pitchFamily="66" charset="0"/>
-              </a:rPr>
-              <a:t>meet that need.</a:t>
-            </a:r>
-            <a:endParaRPr lang="en-IE" sz="2400" dirty="0">
+              <a:t>Phamily Fotos plans to meet that need.</a:t>
+            </a:r>
+            <a:endParaRPr lang="en-IE" sz="2400" b="1" dirty="0">
               <a:latin typeface="Buxton Sketch" panose="03080500000500000004" pitchFamily="66" charset="0"/>
             </a:endParaRPr>
           </a:p>
@@ -4175,7 +4187,603 @@
   <p:timing>
     <p:tnLst>
       <p:par>
-        <p:cTn id="1" dur="indefinite" restart="never" nodeType="tmRoot"/>
+        <p:cTn id="1" dur="indefinite" restart="never" nodeType="tmRoot">
+          <p:childTnLst>
+            <p:seq concurrent="1" nextAc="seek">
+              <p:cTn id="2" dur="indefinite" nodeType="mainSeq">
+                <p:childTnLst>
+                  <p:par>
+                    <p:cTn id="3" fill="hold">
+                      <p:stCondLst>
+                        <p:cond delay="indefinite"/>
+                      </p:stCondLst>
+                      <p:childTnLst>
+                        <p:par>
+                          <p:cTn id="4" fill="hold">
+                            <p:stCondLst>
+                              <p:cond delay="0"/>
+                            </p:stCondLst>
+                            <p:childTnLst>
+                              <p:par>
+                                <p:cTn id="5" presetID="2" presetClass="entr" presetSubtype="8" fill="hold" nodeType="clickEffect">
+                                  <p:stCondLst>
+                                    <p:cond delay="0"/>
+                                  </p:stCondLst>
+                                  <p:childTnLst>
+                                    <p:set>
+                                      <p:cBhvr>
+                                        <p:cTn id="6" dur="1" fill="hold">
+                                          <p:stCondLst>
+                                            <p:cond delay="0"/>
+                                          </p:stCondLst>
+                                        </p:cTn>
+                                        <p:tgtEl>
+                                          <p:spTgt spid="3">
+                                            <p:txEl>
+                                              <p:pRg st="0" end="0"/>
+                                            </p:txEl>
+                                          </p:spTgt>
+                                        </p:tgtEl>
+                                        <p:attrNameLst>
+                                          <p:attrName>style.visibility</p:attrName>
+                                        </p:attrNameLst>
+                                      </p:cBhvr>
+                                      <p:to>
+                                        <p:strVal val="visible"/>
+                                      </p:to>
+                                    </p:set>
+                                    <p:anim calcmode="lin" valueType="num">
+                                      <p:cBhvr additive="base">
+                                        <p:cTn id="7" dur="500" fill="hold"/>
+                                        <p:tgtEl>
+                                          <p:spTgt spid="3">
+                                            <p:txEl>
+                                              <p:pRg st="0" end="0"/>
+                                            </p:txEl>
+                                          </p:spTgt>
+                                        </p:tgtEl>
+                                        <p:attrNameLst>
+                                          <p:attrName>ppt_x</p:attrName>
+                                        </p:attrNameLst>
+                                      </p:cBhvr>
+                                      <p:tavLst>
+                                        <p:tav tm="0">
+                                          <p:val>
+                                            <p:strVal val="0-#ppt_w/2"/>
+                                          </p:val>
+                                        </p:tav>
+                                        <p:tav tm="100000">
+                                          <p:val>
+                                            <p:strVal val="#ppt_x"/>
+                                          </p:val>
+                                        </p:tav>
+                                      </p:tavLst>
+                                    </p:anim>
+                                    <p:anim calcmode="lin" valueType="num">
+                                      <p:cBhvr additive="base">
+                                        <p:cTn id="8" dur="500" fill="hold"/>
+                                        <p:tgtEl>
+                                          <p:spTgt spid="3">
+                                            <p:txEl>
+                                              <p:pRg st="0" end="0"/>
+                                            </p:txEl>
+                                          </p:spTgt>
+                                        </p:tgtEl>
+                                        <p:attrNameLst>
+                                          <p:attrName>ppt_y</p:attrName>
+                                        </p:attrNameLst>
+                                      </p:cBhvr>
+                                      <p:tavLst>
+                                        <p:tav tm="0">
+                                          <p:val>
+                                            <p:strVal val="#ppt_y"/>
+                                          </p:val>
+                                        </p:tav>
+                                        <p:tav tm="100000">
+                                          <p:val>
+                                            <p:strVal val="#ppt_y"/>
+                                          </p:val>
+                                        </p:tav>
+                                      </p:tavLst>
+                                    </p:anim>
+                                  </p:childTnLst>
+                                </p:cTn>
+                              </p:par>
+                            </p:childTnLst>
+                          </p:cTn>
+                        </p:par>
+                        <p:par>
+                          <p:cTn id="9" fill="hold">
+                            <p:stCondLst>
+                              <p:cond delay="500"/>
+                            </p:stCondLst>
+                            <p:childTnLst>
+                              <p:par>
+                                <p:cTn id="10" presetID="2" presetClass="entr" presetSubtype="8" fill="hold" nodeType="afterEffect">
+                                  <p:stCondLst>
+                                    <p:cond delay="0"/>
+                                  </p:stCondLst>
+                                  <p:childTnLst>
+                                    <p:set>
+                                      <p:cBhvr>
+                                        <p:cTn id="11" dur="1" fill="hold">
+                                          <p:stCondLst>
+                                            <p:cond delay="0"/>
+                                          </p:stCondLst>
+                                        </p:cTn>
+                                        <p:tgtEl>
+                                          <p:spTgt spid="3">
+                                            <p:txEl>
+                                              <p:pRg st="1" end="1"/>
+                                            </p:txEl>
+                                          </p:spTgt>
+                                        </p:tgtEl>
+                                        <p:attrNameLst>
+                                          <p:attrName>style.visibility</p:attrName>
+                                        </p:attrNameLst>
+                                      </p:cBhvr>
+                                      <p:to>
+                                        <p:strVal val="visible"/>
+                                      </p:to>
+                                    </p:set>
+                                    <p:anim calcmode="lin" valueType="num">
+                                      <p:cBhvr additive="base">
+                                        <p:cTn id="12" dur="500" fill="hold"/>
+                                        <p:tgtEl>
+                                          <p:spTgt spid="3">
+                                            <p:txEl>
+                                              <p:pRg st="1" end="1"/>
+                                            </p:txEl>
+                                          </p:spTgt>
+                                        </p:tgtEl>
+                                        <p:attrNameLst>
+                                          <p:attrName>ppt_x</p:attrName>
+                                        </p:attrNameLst>
+                                      </p:cBhvr>
+                                      <p:tavLst>
+                                        <p:tav tm="0">
+                                          <p:val>
+                                            <p:strVal val="0-#ppt_w/2"/>
+                                          </p:val>
+                                        </p:tav>
+                                        <p:tav tm="100000">
+                                          <p:val>
+                                            <p:strVal val="#ppt_x"/>
+                                          </p:val>
+                                        </p:tav>
+                                      </p:tavLst>
+                                    </p:anim>
+                                    <p:anim calcmode="lin" valueType="num">
+                                      <p:cBhvr additive="base">
+                                        <p:cTn id="13" dur="500" fill="hold"/>
+                                        <p:tgtEl>
+                                          <p:spTgt spid="3">
+                                            <p:txEl>
+                                              <p:pRg st="1" end="1"/>
+                                            </p:txEl>
+                                          </p:spTgt>
+                                        </p:tgtEl>
+                                        <p:attrNameLst>
+                                          <p:attrName>ppt_y</p:attrName>
+                                        </p:attrNameLst>
+                                      </p:cBhvr>
+                                      <p:tavLst>
+                                        <p:tav tm="0">
+                                          <p:val>
+                                            <p:strVal val="#ppt_y"/>
+                                          </p:val>
+                                        </p:tav>
+                                        <p:tav tm="100000">
+                                          <p:val>
+                                            <p:strVal val="#ppt_y"/>
+                                          </p:val>
+                                        </p:tav>
+                                      </p:tavLst>
+                                    </p:anim>
+                                  </p:childTnLst>
+                                </p:cTn>
+                              </p:par>
+                            </p:childTnLst>
+                          </p:cTn>
+                        </p:par>
+                        <p:par>
+                          <p:cTn id="14" fill="hold">
+                            <p:stCondLst>
+                              <p:cond delay="1000"/>
+                            </p:stCondLst>
+                            <p:childTnLst>
+                              <p:par>
+                                <p:cTn id="15" presetID="2" presetClass="entr" presetSubtype="8" fill="hold" nodeType="afterEffect">
+                                  <p:stCondLst>
+                                    <p:cond delay="0"/>
+                                  </p:stCondLst>
+                                  <p:childTnLst>
+                                    <p:set>
+                                      <p:cBhvr>
+                                        <p:cTn id="16" dur="1" fill="hold">
+                                          <p:stCondLst>
+                                            <p:cond delay="0"/>
+                                          </p:stCondLst>
+                                        </p:cTn>
+                                        <p:tgtEl>
+                                          <p:spTgt spid="3">
+                                            <p:txEl>
+                                              <p:pRg st="2" end="2"/>
+                                            </p:txEl>
+                                          </p:spTgt>
+                                        </p:tgtEl>
+                                        <p:attrNameLst>
+                                          <p:attrName>style.visibility</p:attrName>
+                                        </p:attrNameLst>
+                                      </p:cBhvr>
+                                      <p:to>
+                                        <p:strVal val="visible"/>
+                                      </p:to>
+                                    </p:set>
+                                    <p:anim calcmode="lin" valueType="num">
+                                      <p:cBhvr additive="base">
+                                        <p:cTn id="17" dur="500" fill="hold"/>
+                                        <p:tgtEl>
+                                          <p:spTgt spid="3">
+                                            <p:txEl>
+                                              <p:pRg st="2" end="2"/>
+                                            </p:txEl>
+                                          </p:spTgt>
+                                        </p:tgtEl>
+                                        <p:attrNameLst>
+                                          <p:attrName>ppt_x</p:attrName>
+                                        </p:attrNameLst>
+                                      </p:cBhvr>
+                                      <p:tavLst>
+                                        <p:tav tm="0">
+                                          <p:val>
+                                            <p:strVal val="0-#ppt_w/2"/>
+                                          </p:val>
+                                        </p:tav>
+                                        <p:tav tm="100000">
+                                          <p:val>
+                                            <p:strVal val="#ppt_x"/>
+                                          </p:val>
+                                        </p:tav>
+                                      </p:tavLst>
+                                    </p:anim>
+                                    <p:anim calcmode="lin" valueType="num">
+                                      <p:cBhvr additive="base">
+                                        <p:cTn id="18" dur="500" fill="hold"/>
+                                        <p:tgtEl>
+                                          <p:spTgt spid="3">
+                                            <p:txEl>
+                                              <p:pRg st="2" end="2"/>
+                                            </p:txEl>
+                                          </p:spTgt>
+                                        </p:tgtEl>
+                                        <p:attrNameLst>
+                                          <p:attrName>ppt_y</p:attrName>
+                                        </p:attrNameLst>
+                                      </p:cBhvr>
+                                      <p:tavLst>
+                                        <p:tav tm="0">
+                                          <p:val>
+                                            <p:strVal val="#ppt_y"/>
+                                          </p:val>
+                                        </p:tav>
+                                        <p:tav tm="100000">
+                                          <p:val>
+                                            <p:strVal val="#ppt_y"/>
+                                          </p:val>
+                                        </p:tav>
+                                      </p:tavLst>
+                                    </p:anim>
+                                  </p:childTnLst>
+                                </p:cTn>
+                              </p:par>
+                            </p:childTnLst>
+                          </p:cTn>
+                        </p:par>
+                        <p:par>
+                          <p:cTn id="19" fill="hold">
+                            <p:stCondLst>
+                              <p:cond delay="1500"/>
+                            </p:stCondLst>
+                            <p:childTnLst>
+                              <p:par>
+                                <p:cTn id="20" presetID="2" presetClass="entr" presetSubtype="8" fill="hold" nodeType="afterEffect">
+                                  <p:stCondLst>
+                                    <p:cond delay="0"/>
+                                  </p:stCondLst>
+                                  <p:childTnLst>
+                                    <p:set>
+                                      <p:cBhvr>
+                                        <p:cTn id="21" dur="1" fill="hold">
+                                          <p:stCondLst>
+                                            <p:cond delay="0"/>
+                                          </p:stCondLst>
+                                        </p:cTn>
+                                        <p:tgtEl>
+                                          <p:spTgt spid="3">
+                                            <p:txEl>
+                                              <p:pRg st="3" end="3"/>
+                                            </p:txEl>
+                                          </p:spTgt>
+                                        </p:tgtEl>
+                                        <p:attrNameLst>
+                                          <p:attrName>style.visibility</p:attrName>
+                                        </p:attrNameLst>
+                                      </p:cBhvr>
+                                      <p:to>
+                                        <p:strVal val="visible"/>
+                                      </p:to>
+                                    </p:set>
+                                    <p:anim calcmode="lin" valueType="num">
+                                      <p:cBhvr additive="base">
+                                        <p:cTn id="22" dur="500" fill="hold"/>
+                                        <p:tgtEl>
+                                          <p:spTgt spid="3">
+                                            <p:txEl>
+                                              <p:pRg st="3" end="3"/>
+                                            </p:txEl>
+                                          </p:spTgt>
+                                        </p:tgtEl>
+                                        <p:attrNameLst>
+                                          <p:attrName>ppt_x</p:attrName>
+                                        </p:attrNameLst>
+                                      </p:cBhvr>
+                                      <p:tavLst>
+                                        <p:tav tm="0">
+                                          <p:val>
+                                            <p:strVal val="0-#ppt_w/2"/>
+                                          </p:val>
+                                        </p:tav>
+                                        <p:tav tm="100000">
+                                          <p:val>
+                                            <p:strVal val="#ppt_x"/>
+                                          </p:val>
+                                        </p:tav>
+                                      </p:tavLst>
+                                    </p:anim>
+                                    <p:anim calcmode="lin" valueType="num">
+                                      <p:cBhvr additive="base">
+                                        <p:cTn id="23" dur="500" fill="hold"/>
+                                        <p:tgtEl>
+                                          <p:spTgt spid="3">
+                                            <p:txEl>
+                                              <p:pRg st="3" end="3"/>
+                                            </p:txEl>
+                                          </p:spTgt>
+                                        </p:tgtEl>
+                                        <p:attrNameLst>
+                                          <p:attrName>ppt_y</p:attrName>
+                                        </p:attrNameLst>
+                                      </p:cBhvr>
+                                      <p:tavLst>
+                                        <p:tav tm="0">
+                                          <p:val>
+                                            <p:strVal val="#ppt_y"/>
+                                          </p:val>
+                                        </p:tav>
+                                        <p:tav tm="100000">
+                                          <p:val>
+                                            <p:strVal val="#ppt_y"/>
+                                          </p:val>
+                                        </p:tav>
+                                      </p:tavLst>
+                                    </p:anim>
+                                  </p:childTnLst>
+                                </p:cTn>
+                              </p:par>
+                            </p:childTnLst>
+                          </p:cTn>
+                        </p:par>
+                        <p:par>
+                          <p:cTn id="24" fill="hold">
+                            <p:stCondLst>
+                              <p:cond delay="2000"/>
+                            </p:stCondLst>
+                            <p:childTnLst>
+                              <p:par>
+                                <p:cTn id="25" presetID="2" presetClass="entr" presetSubtype="8" fill="hold" nodeType="afterEffect">
+                                  <p:stCondLst>
+                                    <p:cond delay="0"/>
+                                  </p:stCondLst>
+                                  <p:childTnLst>
+                                    <p:set>
+                                      <p:cBhvr>
+                                        <p:cTn id="26" dur="1" fill="hold">
+                                          <p:stCondLst>
+                                            <p:cond delay="0"/>
+                                          </p:stCondLst>
+                                        </p:cTn>
+                                        <p:tgtEl>
+                                          <p:spTgt spid="3">
+                                            <p:txEl>
+                                              <p:pRg st="4" end="4"/>
+                                            </p:txEl>
+                                          </p:spTgt>
+                                        </p:tgtEl>
+                                        <p:attrNameLst>
+                                          <p:attrName>style.visibility</p:attrName>
+                                        </p:attrNameLst>
+                                      </p:cBhvr>
+                                      <p:to>
+                                        <p:strVal val="visible"/>
+                                      </p:to>
+                                    </p:set>
+                                    <p:anim calcmode="lin" valueType="num">
+                                      <p:cBhvr additive="base">
+                                        <p:cTn id="27" dur="500" fill="hold"/>
+                                        <p:tgtEl>
+                                          <p:spTgt spid="3">
+                                            <p:txEl>
+                                              <p:pRg st="4" end="4"/>
+                                            </p:txEl>
+                                          </p:spTgt>
+                                        </p:tgtEl>
+                                        <p:attrNameLst>
+                                          <p:attrName>ppt_x</p:attrName>
+                                        </p:attrNameLst>
+                                      </p:cBhvr>
+                                      <p:tavLst>
+                                        <p:tav tm="0">
+                                          <p:val>
+                                            <p:strVal val="0-#ppt_w/2"/>
+                                          </p:val>
+                                        </p:tav>
+                                        <p:tav tm="100000">
+                                          <p:val>
+                                            <p:strVal val="#ppt_x"/>
+                                          </p:val>
+                                        </p:tav>
+                                      </p:tavLst>
+                                    </p:anim>
+                                    <p:anim calcmode="lin" valueType="num">
+                                      <p:cBhvr additive="base">
+                                        <p:cTn id="28" dur="500" fill="hold"/>
+                                        <p:tgtEl>
+                                          <p:spTgt spid="3">
+                                            <p:txEl>
+                                              <p:pRg st="4" end="4"/>
+                                            </p:txEl>
+                                          </p:spTgt>
+                                        </p:tgtEl>
+                                        <p:attrNameLst>
+                                          <p:attrName>ppt_y</p:attrName>
+                                        </p:attrNameLst>
+                                      </p:cBhvr>
+                                      <p:tavLst>
+                                        <p:tav tm="0">
+                                          <p:val>
+                                            <p:strVal val="#ppt_y"/>
+                                          </p:val>
+                                        </p:tav>
+                                        <p:tav tm="100000">
+                                          <p:val>
+                                            <p:strVal val="#ppt_y"/>
+                                          </p:val>
+                                        </p:tav>
+                                      </p:tavLst>
+                                    </p:anim>
+                                  </p:childTnLst>
+                                </p:cTn>
+                              </p:par>
+                            </p:childTnLst>
+                          </p:cTn>
+                        </p:par>
+                        <p:par>
+                          <p:cTn id="29" fill="hold">
+                            <p:stCondLst>
+                              <p:cond delay="2500"/>
+                            </p:stCondLst>
+                            <p:childTnLst>
+                              <p:par>
+                                <p:cTn id="30" presetID="2" presetClass="entr" presetSubtype="8" fill="hold" nodeType="afterEffect">
+                                  <p:stCondLst>
+                                    <p:cond delay="0"/>
+                                  </p:stCondLst>
+                                  <p:childTnLst>
+                                    <p:set>
+                                      <p:cBhvr>
+                                        <p:cTn id="31" dur="1" fill="hold">
+                                          <p:stCondLst>
+                                            <p:cond delay="0"/>
+                                          </p:stCondLst>
+                                        </p:cTn>
+                                        <p:tgtEl>
+                                          <p:spTgt spid="3">
+                                            <p:txEl>
+                                              <p:pRg st="5" end="5"/>
+                                            </p:txEl>
+                                          </p:spTgt>
+                                        </p:tgtEl>
+                                        <p:attrNameLst>
+                                          <p:attrName>style.visibility</p:attrName>
+                                        </p:attrNameLst>
+                                      </p:cBhvr>
+                                      <p:to>
+                                        <p:strVal val="visible"/>
+                                      </p:to>
+                                    </p:set>
+                                    <p:anim calcmode="lin" valueType="num">
+                                      <p:cBhvr additive="base">
+                                        <p:cTn id="32" dur="500" fill="hold"/>
+                                        <p:tgtEl>
+                                          <p:spTgt spid="3">
+                                            <p:txEl>
+                                              <p:pRg st="5" end="5"/>
+                                            </p:txEl>
+                                          </p:spTgt>
+                                        </p:tgtEl>
+                                        <p:attrNameLst>
+                                          <p:attrName>ppt_x</p:attrName>
+                                        </p:attrNameLst>
+                                      </p:cBhvr>
+                                      <p:tavLst>
+                                        <p:tav tm="0">
+                                          <p:val>
+                                            <p:strVal val="0-#ppt_w/2"/>
+                                          </p:val>
+                                        </p:tav>
+                                        <p:tav tm="100000">
+                                          <p:val>
+                                            <p:strVal val="#ppt_x"/>
+                                          </p:val>
+                                        </p:tav>
+                                      </p:tavLst>
+                                    </p:anim>
+                                    <p:anim calcmode="lin" valueType="num">
+                                      <p:cBhvr additive="base">
+                                        <p:cTn id="33" dur="500" fill="hold"/>
+                                        <p:tgtEl>
+                                          <p:spTgt spid="3">
+                                            <p:txEl>
+                                              <p:pRg st="5" end="5"/>
+                                            </p:txEl>
+                                          </p:spTgt>
+                                        </p:tgtEl>
+                                        <p:attrNameLst>
+                                          <p:attrName>ppt_y</p:attrName>
+                                        </p:attrNameLst>
+                                      </p:cBhvr>
+                                      <p:tavLst>
+                                        <p:tav tm="0">
+                                          <p:val>
+                                            <p:strVal val="#ppt_y"/>
+                                          </p:val>
+                                        </p:tav>
+                                        <p:tav tm="100000">
+                                          <p:val>
+                                            <p:strVal val="#ppt_y"/>
+                                          </p:val>
+                                        </p:tav>
+                                      </p:tavLst>
+                                    </p:anim>
+                                  </p:childTnLst>
+                                </p:cTn>
+                              </p:par>
+                            </p:childTnLst>
+                          </p:cTn>
+                        </p:par>
+                      </p:childTnLst>
+                    </p:cTn>
+                  </p:par>
+                </p:childTnLst>
+              </p:cTn>
+              <p:prevCondLst>
+                <p:cond evt="onPrev" delay="0">
+                  <p:tgtEl>
+                    <p:sldTgt/>
+                  </p:tgtEl>
+                </p:cond>
+              </p:prevCondLst>
+              <p:nextCondLst>
+                <p:cond evt="onNext" delay="0">
+                  <p:tgtEl>
+                    <p:sldTgt/>
+                  </p:tgtEl>
+                </p:cond>
+              </p:nextCondLst>
+            </p:seq>
+          </p:childTnLst>
+        </p:cTn>
       </p:par>
     </p:tnLst>
   </p:timing>
@@ -4199,6 +4807,36 @@
           <a:chExt cx="0" cy="0"/>
         </a:xfrm>
       </p:grpSpPr>
+      <p:pic>
+        <p:nvPicPr>
+          <p:cNvPr id="6" name="Picture 5"/>
+          <p:cNvPicPr>
+            <a:picLocks noChangeAspect="1"/>
+          </p:cNvPicPr>
+          <p:nvPr/>
+        </p:nvPicPr>
+        <p:blipFill>
+          <a:blip r:embed="rId2">
+            <a:extLst>
+              <a:ext uri="{28A0092B-C50C-407E-A947-70E740481C1C}">
+                <a14:useLocalDpi xmlns:a14="http://schemas.microsoft.com/office/drawing/2010/main" val="0"/>
+              </a:ext>
+            </a:extLst>
+          </a:blip>
+          <a:stretch>
+            <a:fillRect/>
+          </a:stretch>
+        </p:blipFill>
+        <p:spPr>
+          <a:xfrm>
+            <a:off x="3177269" y="2190248"/>
+            <a:ext cx="2834891" cy="4119072"/>
+          </a:xfrm>
+          <a:prstGeom prst="rect">
+            <a:avLst/>
+          </a:prstGeom>
+        </p:spPr>
+      </p:pic>
       <p:sp>
         <p:nvSpPr>
           <p:cNvPr id="2" name="TextBox 1"/>
@@ -4233,64 +4871,6 @@
               <a:t>Research</a:t>
             </a:r>
             <a:endParaRPr lang="en-IE" sz="2400" b="1" dirty="0">
-              <a:latin typeface="Buxton Sketch" panose="03080500000500000004" pitchFamily="66" charset="0"/>
-            </a:endParaRPr>
-          </a:p>
-        </p:txBody>
-      </p:sp>
-      <p:sp>
-        <p:nvSpPr>
-          <p:cNvPr id="3" name="TextBox 2"/>
-          <p:cNvSpPr txBox="1"/>
-          <p:nvPr/>
-        </p:nvSpPr>
-        <p:spPr>
-          <a:xfrm>
-            <a:off x="611560" y="2348880"/>
-            <a:ext cx="7992888" cy="3108543"/>
-          </a:xfrm>
-          <a:prstGeom prst="rect">
-            <a:avLst/>
-          </a:prstGeom>
-          <a:solidFill>
-            <a:schemeClr val="bg1">
-              <a:alpha val="49000"/>
-            </a:schemeClr>
-          </a:solidFill>
-        </p:spPr>
-        <p:txBody>
-          <a:bodyPr wrap="square" rtlCol="0">
-            <a:spAutoFit/>
-          </a:bodyPr>
-          <a:lstStyle/>
-          <a:p>
-            <a:pPr algn="just"/>
-            <a:r>
-              <a:rPr lang="en-IE" sz="2800" dirty="0" smtClean="0">
-                <a:latin typeface="Buxton Sketch" panose="03080500000500000004" pitchFamily="66" charset="0"/>
-              </a:rPr>
-              <a:t>Privacy and the right to control over one’s own image.</a:t>
-            </a:r>
-          </a:p>
-          <a:p>
-            <a:pPr algn="just"/>
-            <a:endParaRPr lang="en-IE" sz="2800" dirty="0">
-              <a:latin typeface="Buxton Sketch" panose="03080500000500000004" pitchFamily="66" charset="0"/>
-            </a:endParaRPr>
-          </a:p>
-          <a:p>
-            <a:pPr algn="just"/>
-            <a:r>
-              <a:rPr lang="en-IE" sz="2800" dirty="0" smtClean="0">
-                <a:latin typeface="Buxton Sketch" panose="03080500000500000004" pitchFamily="66" charset="0"/>
-              </a:rPr>
-              <a:t>This isn’t a new phenomenon and as far back as 1902 a landmark judgement was made against The Rochester Folding Box Company for having used the image of Abigail M Roberson without her permission on a pamphlet promoting Franklin Mills Flour.</a:t>
-            </a:r>
-            <a:r>
-              <a:rPr lang="en-IE" sz="2800" dirty="0"/>
-              <a:t> (Adams, et al., 2007)</a:t>
-            </a:r>
-            <a:endParaRPr lang="en-IE" sz="2800" dirty="0">
               <a:latin typeface="Buxton Sketch" panose="03080500000500000004" pitchFamily="66" charset="0"/>
             </a:endParaRPr>
           </a:p>
@@ -4357,6 +4937,94 @@
           </a:p>
         </p:txBody>
       </p:sp>
+      <p:sp>
+        <p:nvSpPr>
+          <p:cNvPr id="3" name="TextBox 2"/>
+          <p:cNvSpPr txBox="1"/>
+          <p:nvPr/>
+        </p:nvSpPr>
+        <p:spPr>
+          <a:xfrm>
+            <a:off x="611560" y="2348880"/>
+            <a:ext cx="7992888" cy="3108543"/>
+          </a:xfrm>
+          <a:prstGeom prst="rect">
+            <a:avLst/>
+          </a:prstGeom>
+          <a:solidFill>
+            <a:schemeClr val="bg1">
+              <a:alpha val="49000"/>
+            </a:schemeClr>
+          </a:solidFill>
+        </p:spPr>
+        <p:txBody>
+          <a:bodyPr wrap="square" rtlCol="0">
+            <a:spAutoFit/>
+          </a:bodyPr>
+          <a:lstStyle/>
+          <a:p>
+            <a:pPr algn="just"/>
+            <a:r>
+              <a:rPr lang="en-IE" sz="2800" b="1" dirty="0" smtClean="0">
+                <a:latin typeface="Buxton Sketch" panose="03080500000500000004" pitchFamily="66" charset="0"/>
+              </a:rPr>
+              <a:t>Privacy and the right to control over one’s own image.</a:t>
+            </a:r>
+          </a:p>
+          <a:p>
+            <a:pPr algn="just"/>
+            <a:endParaRPr lang="en-IE" sz="2800" b="1" dirty="0">
+              <a:latin typeface="Buxton Sketch" panose="03080500000500000004" pitchFamily="66" charset="0"/>
+            </a:endParaRPr>
+          </a:p>
+          <a:p>
+            <a:pPr algn="just"/>
+            <a:r>
+              <a:rPr lang="en-IE" sz="2800" b="1" dirty="0" smtClean="0">
+                <a:latin typeface="Buxton Sketch" panose="03080500000500000004" pitchFamily="66" charset="0"/>
+              </a:rPr>
+              <a:t>This isn’t a new phenomenon and as far back as 1902 a landmark judgement was made against The Rochester Folding Box Company for having used the image of Abigail M Roberson without her permission on a pamphlet promoting Franklin Mills Flour.</a:t>
+            </a:r>
+            <a:r>
+              <a:rPr lang="en-IE" sz="2800" b="1" dirty="0"/>
+              <a:t> (Adams, et al., 2007)</a:t>
+            </a:r>
+            <a:endParaRPr lang="en-IE" sz="2800" b="1" dirty="0">
+              <a:latin typeface="Buxton Sketch" panose="03080500000500000004" pitchFamily="66" charset="0"/>
+            </a:endParaRPr>
+          </a:p>
+        </p:txBody>
+      </p:sp>
+      <p:pic>
+        <p:nvPicPr>
+          <p:cNvPr id="5" name="Picture 4"/>
+          <p:cNvPicPr>
+            <a:picLocks noChangeAspect="1"/>
+          </p:cNvPicPr>
+          <p:nvPr/>
+        </p:nvPicPr>
+        <p:blipFill>
+          <a:blip r:embed="rId2">
+            <a:extLst>
+              <a:ext uri="{28A0092B-C50C-407E-A947-70E740481C1C}">
+                <a14:useLocalDpi xmlns:a14="http://schemas.microsoft.com/office/drawing/2010/main" val="0"/>
+              </a:ext>
+            </a:extLst>
+          </a:blip>
+          <a:stretch>
+            <a:fillRect/>
+          </a:stretch>
+        </p:blipFill>
+        <p:spPr>
+          <a:xfrm>
+            <a:off x="3190558" y="2174982"/>
+            <a:ext cx="2834891" cy="4119072"/>
+          </a:xfrm>
+          <a:prstGeom prst="rect">
+            <a:avLst/>
+          </a:prstGeom>
+        </p:spPr>
+      </p:pic>
     </p:spTree>
     <p:extLst>
       <p:ext uri="{BB962C8B-B14F-4D97-AF65-F5344CB8AC3E}">
@@ -4370,7 +5038,359 @@
   <p:timing>
     <p:tnLst>
       <p:par>
-        <p:cTn id="1" dur="indefinite" restart="never" nodeType="tmRoot"/>
+        <p:cTn id="1" dur="indefinite" restart="never" nodeType="tmRoot">
+          <p:childTnLst>
+            <p:seq concurrent="1" nextAc="seek">
+              <p:cTn id="2" dur="indefinite" nodeType="mainSeq">
+                <p:childTnLst>
+                  <p:par>
+                    <p:cTn id="3" fill="hold">
+                      <p:stCondLst>
+                        <p:cond delay="indefinite"/>
+                      </p:stCondLst>
+                      <p:childTnLst>
+                        <p:par>
+                          <p:cTn id="4" fill="hold">
+                            <p:stCondLst>
+                              <p:cond delay="0"/>
+                            </p:stCondLst>
+                            <p:childTnLst>
+                              <p:par>
+                                <p:cTn id="5" presetID="2" presetClass="entr" presetSubtype="8" fill="hold" nodeType="clickEffect">
+                                  <p:stCondLst>
+                                    <p:cond delay="0"/>
+                                  </p:stCondLst>
+                                  <p:childTnLst>
+                                    <p:set>
+                                      <p:cBhvr>
+                                        <p:cTn id="6" dur="1" fill="hold">
+                                          <p:stCondLst>
+                                            <p:cond delay="0"/>
+                                          </p:stCondLst>
+                                        </p:cTn>
+                                        <p:tgtEl>
+                                          <p:spTgt spid="3">
+                                            <p:txEl>
+                                              <p:pRg st="0" end="0"/>
+                                            </p:txEl>
+                                          </p:spTgt>
+                                        </p:tgtEl>
+                                        <p:attrNameLst>
+                                          <p:attrName>style.visibility</p:attrName>
+                                        </p:attrNameLst>
+                                      </p:cBhvr>
+                                      <p:to>
+                                        <p:strVal val="visible"/>
+                                      </p:to>
+                                    </p:set>
+                                    <p:anim calcmode="lin" valueType="num">
+                                      <p:cBhvr additive="base">
+                                        <p:cTn id="7" dur="500" fill="hold"/>
+                                        <p:tgtEl>
+                                          <p:spTgt spid="3">
+                                            <p:txEl>
+                                              <p:pRg st="0" end="0"/>
+                                            </p:txEl>
+                                          </p:spTgt>
+                                        </p:tgtEl>
+                                        <p:attrNameLst>
+                                          <p:attrName>ppt_x</p:attrName>
+                                        </p:attrNameLst>
+                                      </p:cBhvr>
+                                      <p:tavLst>
+                                        <p:tav tm="0">
+                                          <p:val>
+                                            <p:strVal val="0-#ppt_w/2"/>
+                                          </p:val>
+                                        </p:tav>
+                                        <p:tav tm="100000">
+                                          <p:val>
+                                            <p:strVal val="#ppt_x"/>
+                                          </p:val>
+                                        </p:tav>
+                                      </p:tavLst>
+                                    </p:anim>
+                                    <p:anim calcmode="lin" valueType="num">
+                                      <p:cBhvr additive="base">
+                                        <p:cTn id="8" dur="500" fill="hold"/>
+                                        <p:tgtEl>
+                                          <p:spTgt spid="3">
+                                            <p:txEl>
+                                              <p:pRg st="0" end="0"/>
+                                            </p:txEl>
+                                          </p:spTgt>
+                                        </p:tgtEl>
+                                        <p:attrNameLst>
+                                          <p:attrName>ppt_y</p:attrName>
+                                        </p:attrNameLst>
+                                      </p:cBhvr>
+                                      <p:tavLst>
+                                        <p:tav tm="0">
+                                          <p:val>
+                                            <p:strVal val="#ppt_y"/>
+                                          </p:val>
+                                        </p:tav>
+                                        <p:tav tm="100000">
+                                          <p:val>
+                                            <p:strVal val="#ppt_y"/>
+                                          </p:val>
+                                        </p:tav>
+                                      </p:tavLst>
+                                    </p:anim>
+                                  </p:childTnLst>
+                                </p:cTn>
+                              </p:par>
+                            </p:childTnLst>
+                          </p:cTn>
+                        </p:par>
+                      </p:childTnLst>
+                    </p:cTn>
+                  </p:par>
+                  <p:par>
+                    <p:cTn id="9" fill="hold">
+                      <p:stCondLst>
+                        <p:cond delay="indefinite"/>
+                      </p:stCondLst>
+                      <p:childTnLst>
+                        <p:par>
+                          <p:cTn id="10" fill="hold">
+                            <p:stCondLst>
+                              <p:cond delay="0"/>
+                            </p:stCondLst>
+                            <p:childTnLst>
+                              <p:par>
+                                <p:cTn id="11" presetID="10" presetClass="entr" presetSubtype="0" fill="hold" nodeType="clickEffect">
+                                  <p:stCondLst>
+                                    <p:cond delay="0"/>
+                                  </p:stCondLst>
+                                  <p:childTnLst>
+                                    <p:set>
+                                      <p:cBhvr>
+                                        <p:cTn id="12" dur="1" fill="hold">
+                                          <p:stCondLst>
+                                            <p:cond delay="0"/>
+                                          </p:stCondLst>
+                                        </p:cTn>
+                                        <p:tgtEl>
+                                          <p:spTgt spid="5"/>
+                                        </p:tgtEl>
+                                        <p:attrNameLst>
+                                          <p:attrName>style.visibility</p:attrName>
+                                        </p:attrNameLst>
+                                      </p:cBhvr>
+                                      <p:to>
+                                        <p:strVal val="visible"/>
+                                      </p:to>
+                                    </p:set>
+                                    <p:animEffect transition="in" filter="fade">
+                                      <p:cBhvr>
+                                        <p:cTn id="13" dur="500"/>
+                                        <p:tgtEl>
+                                          <p:spTgt spid="5"/>
+                                        </p:tgtEl>
+                                      </p:cBhvr>
+                                    </p:animEffect>
+                                  </p:childTnLst>
+                                </p:cTn>
+                              </p:par>
+                            </p:childTnLst>
+                          </p:cTn>
+                        </p:par>
+                      </p:childTnLst>
+                    </p:cTn>
+                  </p:par>
+                  <p:par>
+                    <p:cTn id="14" fill="hold">
+                      <p:stCondLst>
+                        <p:cond delay="indefinite"/>
+                      </p:stCondLst>
+                      <p:childTnLst>
+                        <p:par>
+                          <p:cTn id="15" fill="hold">
+                            <p:stCondLst>
+                              <p:cond delay="0"/>
+                            </p:stCondLst>
+                            <p:childTnLst>
+                              <p:par>
+                                <p:cTn id="16" presetID="2" presetClass="entr" presetSubtype="8" fill="hold" nodeType="clickEffect">
+                                  <p:stCondLst>
+                                    <p:cond delay="0"/>
+                                  </p:stCondLst>
+                                  <p:childTnLst>
+                                    <p:set>
+                                      <p:cBhvr>
+                                        <p:cTn id="17" dur="1" fill="hold">
+                                          <p:stCondLst>
+                                            <p:cond delay="0"/>
+                                          </p:stCondLst>
+                                        </p:cTn>
+                                        <p:tgtEl>
+                                          <p:spTgt spid="3">
+                                            <p:txEl>
+                                              <p:pRg st="2" end="2"/>
+                                            </p:txEl>
+                                          </p:spTgt>
+                                        </p:tgtEl>
+                                        <p:attrNameLst>
+                                          <p:attrName>style.visibility</p:attrName>
+                                        </p:attrNameLst>
+                                      </p:cBhvr>
+                                      <p:to>
+                                        <p:strVal val="visible"/>
+                                      </p:to>
+                                    </p:set>
+                                    <p:anim calcmode="lin" valueType="num">
+                                      <p:cBhvr additive="base">
+                                        <p:cTn id="18" dur="500" fill="hold"/>
+                                        <p:tgtEl>
+                                          <p:spTgt spid="3">
+                                            <p:txEl>
+                                              <p:pRg st="2" end="2"/>
+                                            </p:txEl>
+                                          </p:spTgt>
+                                        </p:tgtEl>
+                                        <p:attrNameLst>
+                                          <p:attrName>ppt_x</p:attrName>
+                                        </p:attrNameLst>
+                                      </p:cBhvr>
+                                      <p:tavLst>
+                                        <p:tav tm="0">
+                                          <p:val>
+                                            <p:strVal val="0-#ppt_w/2"/>
+                                          </p:val>
+                                        </p:tav>
+                                        <p:tav tm="100000">
+                                          <p:val>
+                                            <p:strVal val="#ppt_x"/>
+                                          </p:val>
+                                        </p:tav>
+                                      </p:tavLst>
+                                    </p:anim>
+                                    <p:anim calcmode="lin" valueType="num">
+                                      <p:cBhvr additive="base">
+                                        <p:cTn id="19" dur="500" fill="hold"/>
+                                        <p:tgtEl>
+                                          <p:spTgt spid="3">
+                                            <p:txEl>
+                                              <p:pRg st="2" end="2"/>
+                                            </p:txEl>
+                                          </p:spTgt>
+                                        </p:tgtEl>
+                                        <p:attrNameLst>
+                                          <p:attrName>ppt_y</p:attrName>
+                                        </p:attrNameLst>
+                                      </p:cBhvr>
+                                      <p:tavLst>
+                                        <p:tav tm="0">
+                                          <p:val>
+                                            <p:strVal val="#ppt_y"/>
+                                          </p:val>
+                                        </p:tav>
+                                        <p:tav tm="100000">
+                                          <p:val>
+                                            <p:strVal val="#ppt_y"/>
+                                          </p:val>
+                                        </p:tav>
+                                      </p:tavLst>
+                                    </p:anim>
+                                  </p:childTnLst>
+                                </p:cTn>
+                              </p:par>
+                              <p:par>
+                                <p:cTn id="20" presetID="10" presetClass="exit" presetSubtype="0" fill="hold" nodeType="withEffect">
+                                  <p:stCondLst>
+                                    <p:cond delay="0"/>
+                                  </p:stCondLst>
+                                  <p:childTnLst>
+                                    <p:animEffect transition="out" filter="fade">
+                                      <p:cBhvr>
+                                        <p:cTn id="21" dur="500"/>
+                                        <p:tgtEl>
+                                          <p:spTgt spid="5"/>
+                                        </p:tgtEl>
+                                      </p:cBhvr>
+                                    </p:animEffect>
+                                    <p:set>
+                                      <p:cBhvr>
+                                        <p:cTn id="22" dur="1" fill="hold">
+                                          <p:stCondLst>
+                                            <p:cond delay="499"/>
+                                          </p:stCondLst>
+                                        </p:cTn>
+                                        <p:tgtEl>
+                                          <p:spTgt spid="5"/>
+                                        </p:tgtEl>
+                                        <p:attrNameLst>
+                                          <p:attrName>style.visibility</p:attrName>
+                                        </p:attrNameLst>
+                                      </p:cBhvr>
+                                      <p:to>
+                                        <p:strVal val="hidden"/>
+                                      </p:to>
+                                    </p:set>
+                                  </p:childTnLst>
+                                </p:cTn>
+                              </p:par>
+                              <p:par>
+                                <p:cTn id="23" presetID="10" presetClass="entr" presetSubtype="0" fill="hold" nodeType="withEffect">
+                                  <p:stCondLst>
+                                    <p:cond delay="0"/>
+                                  </p:stCondLst>
+                                  <p:childTnLst>
+                                    <p:set>
+                                      <p:cBhvr>
+                                        <p:cTn id="24" dur="1" fill="hold">
+                                          <p:stCondLst>
+                                            <p:cond delay="0"/>
+                                          </p:stCondLst>
+                                        </p:cTn>
+                                        <p:tgtEl>
+                                          <p:spTgt spid="6"/>
+                                        </p:tgtEl>
+                                        <p:attrNameLst>
+                                          <p:attrName>style.visibility</p:attrName>
+                                        </p:attrNameLst>
+                                      </p:cBhvr>
+                                      <p:to>
+                                        <p:strVal val="visible"/>
+                                      </p:to>
+                                    </p:set>
+                                    <p:animEffect transition="in" filter="fade">
+                                      <p:cBhvr>
+                                        <p:cTn id="25" dur="500"/>
+                                        <p:tgtEl>
+                                          <p:spTgt spid="6"/>
+                                        </p:tgtEl>
+                                      </p:cBhvr>
+                                    </p:animEffect>
+                                  </p:childTnLst>
+                                </p:cTn>
+                              </p:par>
+                            </p:childTnLst>
+                          </p:cTn>
+                        </p:par>
+                      </p:childTnLst>
+                    </p:cTn>
+                  </p:par>
+                </p:childTnLst>
+              </p:cTn>
+              <p:prevCondLst>
+                <p:cond evt="onPrev" delay="0">
+                  <p:tgtEl>
+                    <p:sldTgt/>
+                  </p:tgtEl>
+                </p:cond>
+              </p:prevCondLst>
+              <p:nextCondLst>
+                <p:cond evt="onNext" delay="0">
+                  <p:tgtEl>
+                    <p:sldTgt/>
+                  </p:tgtEl>
+                </p:cond>
+              </p:nextCondLst>
+            </p:seq>
+          </p:childTnLst>
+        </p:cTn>
       </p:par>
     </p:tnLst>
   </p:timing>

</xml_diff>